<commit_message>
added in some slides
</commit_message>
<xml_diff>
--- a/March17_2019/ERV_regulate_immunity.pptx
+++ b/March17_2019/ERV_regulate_immunity.pptx
@@ -5,12 +5,12 @@
     <p:sldMasterId id="2147483648" r:id="rId1"/>
   </p:sldMasterIdLst>
   <p:notesMasterIdLst>
-    <p:notesMasterId r:id="rId14"/>
+    <p:notesMasterId r:id="rId15"/>
   </p:notesMasterIdLst>
   <p:sldIdLst>
     <p:sldId id="256" r:id="rId2"/>
-    <p:sldId id="260" r:id="rId3"/>
-    <p:sldId id="258" r:id="rId4"/>
+    <p:sldId id="258" r:id="rId3"/>
+    <p:sldId id="260" r:id="rId4"/>
     <p:sldId id="257" r:id="rId5"/>
     <p:sldId id="259" r:id="rId6"/>
     <p:sldId id="261" r:id="rId7"/>
@@ -20,6 +20,7 @@
     <p:sldId id="267" r:id="rId11"/>
     <p:sldId id="266" r:id="rId12"/>
     <p:sldId id="265" r:id="rId13"/>
+    <p:sldId id="268" r:id="rId14"/>
   </p:sldIdLst>
   <p:sldSz cx="9144000" cy="6858000" type="screen4x3"/>
   <p:notesSz cx="6858000" cy="9144000"/>
@@ -203,7 +204,7 @@
           <a:p>
             <a:fld id="{BC15A221-70CD-B844-B823-A5BA3F2DB25F}" type="datetimeFigureOut">
               <a:rPr lang="en-US" smtClean="0"/>
-              <a:t>3/19/19</a:t>
+              <a:t>3/26/19</a:t>
             </a:fld>
             <a:endParaRPr lang="en-US"/>
           </a:p>
@@ -742,7 +743,7 @@
         <p:nvSpPr>
           <p:cNvPr id="4098" name="Text Box 2"/>
           <p:cNvSpPr txBox="1">
-            <a:spLocks noChangeArrowheads="1"/>
+            <a:spLocks noGrp="1" noChangeArrowheads="1"/>
           </p:cNvSpPr>
           <p:nvPr>
             <p:ph type="body"/>
@@ -1211,6 +1212,244 @@
 </p:notes>
 </file>
 
+<file path=ppt/notesSlides/notesSlide4.xml><?xml version="1.0" encoding="utf-8"?>
+<p:notes xmlns:a="http://schemas.openxmlformats.org/drawingml/2006/main" xmlns:r="http://schemas.openxmlformats.org/officeDocument/2006/relationships" xmlns:p="http://schemas.openxmlformats.org/presentationml/2006/main">
+  <p:cSld>
+    <p:spTree>
+      <p:nvGrpSpPr>
+        <p:cNvPr id="1" name=""/>
+        <p:cNvGrpSpPr/>
+        <p:nvPr/>
+      </p:nvGrpSpPr>
+      <p:grpSpPr>
+        <a:xfrm>
+          <a:off x="0" y="0"/>
+          <a:ext cx="0" cy="0"/>
+          <a:chOff x="0" y="0"/>
+          <a:chExt cx="0" cy="0"/>
+        </a:xfrm>
+      </p:grpSpPr>
+      <p:sp>
+        <p:nvSpPr>
+          <p:cNvPr id="2" name="Slide Image Placeholder 1"/>
+          <p:cNvSpPr>
+            <a:spLocks noGrp="1" noRot="1" noChangeAspect="1"/>
+          </p:cNvSpPr>
+          <p:nvPr>
+            <p:ph type="sldImg"/>
+          </p:nvPr>
+        </p:nvSpPr>
+        <p:spPr/>
+      </p:sp>
+      <p:sp>
+        <p:nvSpPr>
+          <p:cNvPr id="3" name="Notes Placeholder 2"/>
+          <p:cNvSpPr>
+            <a:spLocks noGrp="1"/>
+          </p:cNvSpPr>
+          <p:nvPr>
+            <p:ph type="body" idx="1"/>
+          </p:nvPr>
+        </p:nvSpPr>
+        <p:spPr/>
+        <p:txBody>
+          <a:bodyPr/>
+          <a:lstStyle/>
+          <a:p>
+            <a:r>
+              <a:rPr lang="en-US" dirty="0" smtClean="0"/>
+              <a:t>In this case</a:t>
+            </a:r>
+            <a:r>
+              <a:rPr lang="en-US" baseline="0" dirty="0" smtClean="0"/>
+              <a:t> the difference in expression pre and post deletion is not fully explained. So these sites are perhaps shadow enhancers</a:t>
+            </a:r>
+            <a:endParaRPr lang="en-US" dirty="0"/>
+          </a:p>
+        </p:txBody>
+      </p:sp>
+      <p:sp>
+        <p:nvSpPr>
+          <p:cNvPr id="4" name="Slide Number Placeholder 3"/>
+          <p:cNvSpPr>
+            <a:spLocks noGrp="1"/>
+          </p:cNvSpPr>
+          <p:nvPr>
+            <p:ph type="sldNum" sz="quarter" idx="10"/>
+          </p:nvPr>
+        </p:nvSpPr>
+        <p:spPr/>
+        <p:txBody>
+          <a:bodyPr/>
+          <a:lstStyle/>
+          <a:p>
+            <a:fld id="{2060227C-C392-3443-B734-BFF473228FA6}" type="slidenum">
+              <a:rPr lang="en-US" smtClean="0"/>
+              <a:t>12</a:t>
+            </a:fld>
+            <a:endParaRPr lang="en-US"/>
+          </a:p>
+        </p:txBody>
+      </p:sp>
+    </p:spTree>
+    <p:extLst>
+      <p:ext uri="{BB962C8B-B14F-4D97-AF65-F5344CB8AC3E}">
+        <p14:creationId xmlns:p14="http://schemas.microsoft.com/office/powerpoint/2010/main" val="1298418562"/>
+      </p:ext>
+    </p:extLst>
+  </p:cSld>
+  <p:clrMapOvr>
+    <a:masterClrMapping/>
+  </p:clrMapOvr>
+</p:notes>
+</file>
+
+<file path=ppt/notesSlides/notesSlide5.xml><?xml version="1.0" encoding="utf-8"?>
+<p:notes xmlns:a="http://schemas.openxmlformats.org/drawingml/2006/main" xmlns:r="http://schemas.openxmlformats.org/officeDocument/2006/relationships" xmlns:p="http://schemas.openxmlformats.org/presentationml/2006/main">
+  <p:cSld>
+    <p:spTree>
+      <p:nvGrpSpPr>
+        <p:cNvPr id="1" name=""/>
+        <p:cNvGrpSpPr/>
+        <p:nvPr/>
+      </p:nvGrpSpPr>
+      <p:grpSpPr>
+        <a:xfrm>
+          <a:off x="0" y="0"/>
+          <a:ext cx="0" cy="0"/>
+          <a:chOff x="0" y="0"/>
+          <a:chExt cx="0" cy="0"/>
+        </a:xfrm>
+      </p:grpSpPr>
+      <p:sp>
+        <p:nvSpPr>
+          <p:cNvPr id="2" name="Slide Image Placeholder 1"/>
+          <p:cNvSpPr>
+            <a:spLocks noGrp="1" noRot="1" noChangeAspect="1"/>
+          </p:cNvSpPr>
+          <p:nvPr>
+            <p:ph type="sldImg"/>
+          </p:nvPr>
+        </p:nvSpPr>
+        <p:spPr/>
+      </p:sp>
+      <p:sp>
+        <p:nvSpPr>
+          <p:cNvPr id="3" name="Notes Placeholder 2"/>
+          <p:cNvSpPr>
+            <a:spLocks noGrp="1"/>
+          </p:cNvSpPr>
+          <p:nvPr>
+            <p:ph type="body" idx="1"/>
+          </p:nvPr>
+        </p:nvSpPr>
+        <p:spPr/>
+        <p:txBody>
+          <a:bodyPr/>
+          <a:lstStyle/>
+          <a:p>
+            <a:r>
+              <a:rPr lang="en-US" dirty="0" smtClean="0"/>
+              <a:t>1.MER41 family ERVs are </a:t>
+            </a:r>
+            <a:r>
+              <a:rPr lang="en-US" dirty="0" err="1" smtClean="0"/>
+              <a:t>ubiquitious</a:t>
+            </a:r>
+            <a:r>
+              <a:rPr lang="en-US" dirty="0" smtClean="0"/>
+              <a:t> across mammals; all came 50 to 100 mil </a:t>
+            </a:r>
+            <a:r>
+              <a:rPr lang="en-US" dirty="0" err="1" smtClean="0"/>
+              <a:t>yrs</a:t>
+            </a:r>
+            <a:r>
+              <a:rPr lang="en-US" baseline="0" dirty="0" smtClean="0"/>
+              <a:t> ago; they also have several intact instances of the STAT1 motif</a:t>
+            </a:r>
+          </a:p>
+          <a:p>
+            <a:r>
+              <a:rPr lang="en-US" baseline="0" dirty="0" smtClean="0"/>
+              <a:t>2.Taking the MER41 sequences from cow and dog gives </a:t>
+            </a:r>
+            <a:r>
+              <a:rPr lang="en-US" baseline="0" dirty="0" err="1" smtClean="0"/>
+              <a:t>lucifersase</a:t>
+            </a:r>
+            <a:r>
+              <a:rPr lang="en-US" baseline="0" dirty="0" smtClean="0"/>
+              <a:t> activity in </a:t>
+            </a:r>
+            <a:r>
+              <a:rPr lang="en-US" baseline="0" dirty="0" err="1" smtClean="0"/>
+              <a:t>HeLa</a:t>
+            </a:r>
+            <a:r>
+              <a:rPr lang="en-US" baseline="0" dirty="0" smtClean="0"/>
+              <a:t> cells</a:t>
+            </a:r>
+          </a:p>
+          <a:p>
+            <a:r>
+              <a:rPr lang="en-US" baseline="0" dirty="0" smtClean="0"/>
+              <a:t>3. Rodents like mouse were invaded by a </a:t>
+            </a:r>
+            <a:r>
+              <a:rPr lang="en-US" baseline="0" dirty="0" err="1" smtClean="0"/>
+              <a:t>separeate</a:t>
+            </a:r>
+            <a:r>
+              <a:rPr lang="en-US" baseline="0" dirty="0" smtClean="0"/>
+              <a:t> ERV family called RLTR 30B; which gives rise to different IFNG inducible binding sites in mouse;</a:t>
+            </a:r>
+          </a:p>
+          <a:p>
+            <a:r>
+              <a:rPr lang="en-US" baseline="0" dirty="0" smtClean="0"/>
+              <a:t>those sequences also show good luciferase activity</a:t>
+            </a:r>
+            <a:endParaRPr lang="en-US" dirty="0"/>
+          </a:p>
+        </p:txBody>
+      </p:sp>
+      <p:sp>
+        <p:nvSpPr>
+          <p:cNvPr id="4" name="Slide Number Placeholder 3"/>
+          <p:cNvSpPr>
+            <a:spLocks noGrp="1"/>
+          </p:cNvSpPr>
+          <p:nvPr>
+            <p:ph type="sldNum" sz="quarter" idx="10"/>
+          </p:nvPr>
+        </p:nvSpPr>
+        <p:spPr/>
+        <p:txBody>
+          <a:bodyPr/>
+          <a:lstStyle/>
+          <a:p>
+            <a:fld id="{2060227C-C392-3443-B734-BFF473228FA6}" type="slidenum">
+              <a:rPr lang="en-US" smtClean="0"/>
+              <a:t>13</a:t>
+            </a:fld>
+            <a:endParaRPr lang="en-US"/>
+          </a:p>
+        </p:txBody>
+      </p:sp>
+    </p:spTree>
+    <p:extLst>
+      <p:ext uri="{BB962C8B-B14F-4D97-AF65-F5344CB8AC3E}">
+        <p14:creationId xmlns:p14="http://schemas.microsoft.com/office/powerpoint/2010/main" val="2193151495"/>
+      </p:ext>
+    </p:extLst>
+  </p:cSld>
+  <p:clrMapOvr>
+    <a:masterClrMapping/>
+  </p:clrMapOvr>
+</p:notes>
+</file>
+
 <file path=ppt/slideLayouts/slideLayout1.xml><?xml version="1.0" encoding="utf-8"?>
 <p:sldLayout xmlns:a="http://schemas.openxmlformats.org/drawingml/2006/main" xmlns:r="http://schemas.openxmlformats.org/officeDocument/2006/relationships" xmlns:p="http://schemas.openxmlformats.org/presentationml/2006/main" type="title" preserve="1">
   <p:cSld name="Title Slide">
@@ -1392,7 +1631,7 @@
           <a:p>
             <a:fld id="{4B17166A-0A3C-6C41-8CE2-5DF557C479BB}" type="datetimeFigureOut">
               <a:rPr lang="en-US" smtClean="0"/>
-              <a:t>3/19/19</a:t>
+              <a:t>3/26/19</a:t>
             </a:fld>
             <a:endParaRPr lang="en-US"/>
           </a:p>
@@ -1562,7 +1801,7 @@
           <a:p>
             <a:fld id="{4B17166A-0A3C-6C41-8CE2-5DF557C479BB}" type="datetimeFigureOut">
               <a:rPr lang="en-US" smtClean="0"/>
-              <a:t>3/19/19</a:t>
+              <a:t>3/26/19</a:t>
             </a:fld>
             <a:endParaRPr lang="en-US"/>
           </a:p>
@@ -1742,7 +1981,7 @@
           <a:p>
             <a:fld id="{4B17166A-0A3C-6C41-8CE2-5DF557C479BB}" type="datetimeFigureOut">
               <a:rPr lang="en-US" smtClean="0"/>
-              <a:t>3/19/19</a:t>
+              <a:t>3/26/19</a:t>
             </a:fld>
             <a:endParaRPr lang="en-US"/>
           </a:p>
@@ -1912,7 +2151,7 @@
           <a:p>
             <a:fld id="{4B17166A-0A3C-6C41-8CE2-5DF557C479BB}" type="datetimeFigureOut">
               <a:rPr lang="en-US" smtClean="0"/>
-              <a:t>3/19/19</a:t>
+              <a:t>3/26/19</a:t>
             </a:fld>
             <a:endParaRPr lang="en-US"/>
           </a:p>
@@ -2158,7 +2397,7 @@
           <a:p>
             <a:fld id="{4B17166A-0A3C-6C41-8CE2-5DF557C479BB}" type="datetimeFigureOut">
               <a:rPr lang="en-US" smtClean="0"/>
-              <a:t>3/19/19</a:t>
+              <a:t>3/26/19</a:t>
             </a:fld>
             <a:endParaRPr lang="en-US"/>
           </a:p>
@@ -2446,7 +2685,7 @@
           <a:p>
             <a:fld id="{4B17166A-0A3C-6C41-8CE2-5DF557C479BB}" type="datetimeFigureOut">
               <a:rPr lang="en-US" smtClean="0"/>
-              <a:t>3/19/19</a:t>
+              <a:t>3/26/19</a:t>
             </a:fld>
             <a:endParaRPr lang="en-US"/>
           </a:p>
@@ -2868,7 +3107,7 @@
           <a:p>
             <a:fld id="{4B17166A-0A3C-6C41-8CE2-5DF557C479BB}" type="datetimeFigureOut">
               <a:rPr lang="en-US" smtClean="0"/>
-              <a:t>3/19/19</a:t>
+              <a:t>3/26/19</a:t>
             </a:fld>
             <a:endParaRPr lang="en-US"/>
           </a:p>
@@ -2986,7 +3225,7 @@
           <a:p>
             <a:fld id="{4B17166A-0A3C-6C41-8CE2-5DF557C479BB}" type="datetimeFigureOut">
               <a:rPr lang="en-US" smtClean="0"/>
-              <a:t>3/19/19</a:t>
+              <a:t>3/26/19</a:t>
             </a:fld>
             <a:endParaRPr lang="en-US"/>
           </a:p>
@@ -3081,7 +3320,7 @@
           <a:p>
             <a:fld id="{4B17166A-0A3C-6C41-8CE2-5DF557C479BB}" type="datetimeFigureOut">
               <a:rPr lang="en-US" smtClean="0"/>
-              <a:t>3/19/19</a:t>
+              <a:t>3/26/19</a:t>
             </a:fld>
             <a:endParaRPr lang="en-US"/>
           </a:p>
@@ -3358,7 +3597,7 @@
           <a:p>
             <a:fld id="{4B17166A-0A3C-6C41-8CE2-5DF557C479BB}" type="datetimeFigureOut">
               <a:rPr lang="en-US" smtClean="0"/>
-              <a:t>3/19/19</a:t>
+              <a:t>3/26/19</a:t>
             </a:fld>
             <a:endParaRPr lang="en-US"/>
           </a:p>
@@ -3611,7 +3850,7 @@
           <a:p>
             <a:fld id="{4B17166A-0A3C-6C41-8CE2-5DF557C479BB}" type="datetimeFigureOut">
               <a:rPr lang="en-US" smtClean="0"/>
-              <a:t>3/19/19</a:t>
+              <a:t>3/26/19</a:t>
             </a:fld>
             <a:endParaRPr lang="en-US"/>
           </a:p>
@@ -3824,7 +4063,7 @@
           <a:p>
             <a:fld id="{4B17166A-0A3C-6C41-8CE2-5DF557C479BB}" type="datetimeFigureOut">
               <a:rPr lang="en-US" smtClean="0"/>
-              <a:t>3/19/19</a:t>
+              <a:t>3/26/19</a:t>
             </a:fld>
             <a:endParaRPr lang="en-US"/>
           </a:p>
@@ -4241,7 +4480,15 @@
           <a:p>
             <a:r>
               <a:rPr lang="en-US" dirty="0" smtClean="0"/>
-              <a:t>19 March 2019</a:t>
+              <a:t>26</a:t>
+            </a:r>
+            <a:r>
+              <a:rPr lang="en-US" dirty="0" smtClean="0"/>
+              <a:t> </a:t>
+            </a:r>
+            <a:r>
+              <a:rPr lang="en-US" dirty="0" smtClean="0"/>
+              <a:t>March 2019</a:t>
             </a:r>
             <a:endParaRPr lang="en-US" dirty="0"/>
           </a:p>
@@ -5333,7 +5580,7 @@
   <p:timing>
     <p:tnLst>
       <p:par>
-        <p:cTn xmlns:p14="http://schemas.microsoft.com/office/powerpoint/2010/main" id="1" dur="indefinite" nodeType="tmRoot">
+        <p:cTn xmlns:p14="http://schemas.microsoft.com/office/powerpoint/2010/main" id="1" dur="indefinite" restart="never" nodeType="tmRoot">
           <p:childTnLst>
             <p:seq concurrent="1" nextAc="seek">
               <p:cTn id="2" dur="0" nodeType="mainSeq"/>
@@ -5411,7 +5658,7 @@
         <p:spPr>
           <a:xfrm>
             <a:off x="457200" y="1464109"/>
-            <a:ext cx="8229600" cy="4801315"/>
+            <a:ext cx="8229600" cy="3693319"/>
           </a:xfrm>
           <a:prstGeom prst="rect">
             <a:avLst/>
@@ -5422,24 +5669,6 @@
             <a:spAutoFit/>
           </a:bodyPr>
           <a:lstStyle/>
-          <a:p>
-            <a:pPr marL="285750" indent="-285750">
-              <a:buFont typeface="Arial"/>
-              <a:buChar char="•"/>
-            </a:pPr>
-            <a:r>
-              <a:rPr lang="en-US" dirty="0"/>
-              <a:t>CRISPR-Cas9 system to delete the MER41.AIM2 element in </a:t>
-            </a:r>
-            <a:r>
-              <a:rPr lang="en-US" dirty="0" err="1"/>
-              <a:t>HeLa</a:t>
-            </a:r>
-            <a:r>
-              <a:rPr lang="en-US" dirty="0"/>
-              <a:t> cells (fig. S6) (18). Cells homozygous for the MER41.AIM2 deletion (ΔMER41.AIM2) failed to express AIM2 upon IFNG treatment, in contrast to control cells in which AIM2 transcript levels were robustly induced by IFNG (Fig. 2B)</a:t>
-            </a:r>
-          </a:p>
           <a:p>
             <a:endParaRPr lang="en-US" dirty="0" smtClean="0"/>
           </a:p>
@@ -5545,32 +5774,49 @@
         </p:nvSpPr>
         <p:spPr/>
         <p:txBody>
-          <a:bodyPr/>
+          <a:bodyPr>
+            <a:normAutofit/>
+          </a:bodyPr>
           <a:lstStyle/>
           <a:p>
-            <a:endParaRPr lang="en-US"/>
-          </a:p>
-        </p:txBody>
-      </p:sp>
-      <p:sp>
-        <p:nvSpPr>
-          <p:cNvPr id="3" name="Content Placeholder 2"/>
-          <p:cNvSpPr>
-            <a:spLocks noGrp="1"/>
-          </p:cNvSpPr>
-          <p:nvPr>
-            <p:ph idx="1"/>
-          </p:nvPr>
-        </p:nvSpPr>
-        <p:spPr/>
-        <p:txBody>
-          <a:bodyPr/>
-          <a:lstStyle/>
-          <a:p>
-            <a:endParaRPr lang="en-US"/>
-          </a:p>
-        </p:txBody>
-      </p:sp>
+            <a:r>
+              <a:rPr lang="en-US" sz="2800" dirty="0" smtClean="0"/>
+              <a:t>Multiple MER41 elements have been co-opted to regulate IFNG response</a:t>
+            </a:r>
+            <a:endParaRPr lang="en-US" sz="2800" dirty="0"/>
+          </a:p>
+        </p:txBody>
+      </p:sp>
+      <p:pic>
+        <p:nvPicPr>
+          <p:cNvPr id="4" name="Picture 3" descr="F3.large.jpg"/>
+          <p:cNvPicPr>
+            <a:picLocks noChangeAspect="1"/>
+          </p:cNvPicPr>
+          <p:nvPr/>
+        </p:nvPicPr>
+        <p:blipFill>
+          <a:blip r:embed="rId3">
+            <a:extLst>
+              <a:ext uri="{28A0092B-C50C-407E-A947-70E740481C1C}">
+                <a14:useLocalDpi xmlns:a14="http://schemas.microsoft.com/office/drawing/2010/main" val="0"/>
+              </a:ext>
+            </a:extLst>
+          </a:blip>
+          <a:stretch>
+            <a:fillRect/>
+          </a:stretch>
+        </p:blipFill>
+        <p:spPr>
+          <a:xfrm>
+            <a:off x="457200" y="2201542"/>
+            <a:ext cx="7804797" cy="3749961"/>
+          </a:xfrm>
+          <a:prstGeom prst="rect">
+            <a:avLst/>
+          </a:prstGeom>
+        </p:spPr>
+      </p:pic>
     </p:spTree>
     <p:extLst>
       <p:ext uri="{BB962C8B-B14F-4D97-AF65-F5344CB8AC3E}">
@@ -5584,7 +5830,7 @@
 </p:sld>
 </file>
 
-<file path=ppt/slides/slide2.xml><?xml version="1.0" encoding="utf-8"?>
+<file path=ppt/slides/slide13.xml><?xml version="1.0" encoding="utf-8"?>
 <p:sld xmlns:a="http://schemas.openxmlformats.org/drawingml/2006/main" xmlns:r="http://schemas.openxmlformats.org/officeDocument/2006/relationships" xmlns:p="http://schemas.openxmlformats.org/presentationml/2006/main">
   <p:cSld>
     <p:spTree>
@@ -5601,16 +5847,41 @@
           <a:chExt cx="0" cy="0"/>
         </a:xfrm>
       </p:grpSpPr>
+      <p:sp>
+        <p:nvSpPr>
+          <p:cNvPr id="2" name="Title 1"/>
+          <p:cNvSpPr>
+            <a:spLocks noGrp="1"/>
+          </p:cNvSpPr>
+          <p:nvPr>
+            <p:ph type="title"/>
+          </p:nvPr>
+        </p:nvSpPr>
+        <p:spPr/>
+        <p:txBody>
+          <a:bodyPr>
+            <a:normAutofit/>
+          </a:bodyPr>
+          <a:lstStyle/>
+          <a:p>
+            <a:r>
+              <a:rPr lang="en-US" sz="2800" dirty="0" smtClean="0"/>
+              <a:t>IFNG inducible ERVs are pervasive in mammalian genomes</a:t>
+            </a:r>
+            <a:endParaRPr lang="en-US" sz="2800" dirty="0"/>
+          </a:p>
+        </p:txBody>
+      </p:sp>
       <p:pic>
         <p:nvPicPr>
-          <p:cNvPr id="4" name="Picture 3" descr="About.png"/>
+          <p:cNvPr id="4" name="Picture 3" descr="F4.large.jpg"/>
           <p:cNvPicPr>
             <a:picLocks noChangeAspect="1"/>
           </p:cNvPicPr>
           <p:nvPr/>
         </p:nvPicPr>
         <p:blipFill>
-          <a:blip r:embed="rId2">
+          <a:blip r:embed="rId3">
             <a:extLst>
               <a:ext uri="{28A0092B-C50C-407E-A947-70E740481C1C}">
                 <a14:useLocalDpi xmlns:a14="http://schemas.microsoft.com/office/drawing/2010/main" val="0"/>
@@ -5623,8 +5894,8 @@
         </p:blipFill>
         <p:spPr>
           <a:xfrm>
-            <a:off x="190500" y="1612900"/>
-            <a:ext cx="8763000" cy="3619500"/>
+            <a:off x="457201" y="1580898"/>
+            <a:ext cx="8387670" cy="4401206"/>
           </a:xfrm>
           <a:prstGeom prst="rect">
             <a:avLst/>
@@ -5634,7 +5905,7 @@
     </p:spTree>
     <p:extLst>
       <p:ext uri="{BB962C8B-B14F-4D97-AF65-F5344CB8AC3E}">
-        <p14:creationId xmlns:p14="http://schemas.microsoft.com/office/powerpoint/2010/main" val="3829269264"/>
+        <p14:creationId xmlns:p14="http://schemas.microsoft.com/office/powerpoint/2010/main" val="2890747559"/>
       </p:ext>
     </p:extLst>
   </p:cSld>
@@ -5644,7 +5915,7 @@
 </p:sld>
 </file>
 
-<file path=ppt/slides/slide3.xml><?xml version="1.0" encoding="utf-8"?>
+<file path=ppt/slides/slide2.xml><?xml version="1.0" encoding="utf-8"?>
 <p:sld xmlns:a="http://schemas.openxmlformats.org/drawingml/2006/main" xmlns:r="http://schemas.openxmlformats.org/officeDocument/2006/relationships" xmlns:p="http://schemas.openxmlformats.org/presentationml/2006/main">
   <p:cSld>
     <p:spTree>
@@ -5780,6 +6051,66 @@
     <p:extLst>
       <p:ext uri="{BB962C8B-B14F-4D97-AF65-F5344CB8AC3E}">
         <p14:creationId xmlns:p14="http://schemas.microsoft.com/office/powerpoint/2010/main" val="659433024"/>
+      </p:ext>
+    </p:extLst>
+  </p:cSld>
+  <p:clrMapOvr>
+    <a:masterClrMapping/>
+  </p:clrMapOvr>
+</p:sld>
+</file>
+
+<file path=ppt/slides/slide3.xml><?xml version="1.0" encoding="utf-8"?>
+<p:sld xmlns:a="http://schemas.openxmlformats.org/drawingml/2006/main" xmlns:r="http://schemas.openxmlformats.org/officeDocument/2006/relationships" xmlns:p="http://schemas.openxmlformats.org/presentationml/2006/main">
+  <p:cSld>
+    <p:spTree>
+      <p:nvGrpSpPr>
+        <p:cNvPr id="1" name=""/>
+        <p:cNvGrpSpPr/>
+        <p:nvPr/>
+      </p:nvGrpSpPr>
+      <p:grpSpPr>
+        <a:xfrm>
+          <a:off x="0" y="0"/>
+          <a:ext cx="0" cy="0"/>
+          <a:chOff x="0" y="0"/>
+          <a:chExt cx="0" cy="0"/>
+        </a:xfrm>
+      </p:grpSpPr>
+      <p:pic>
+        <p:nvPicPr>
+          <p:cNvPr id="4" name="Picture 3" descr="About.png"/>
+          <p:cNvPicPr>
+            <a:picLocks noChangeAspect="1"/>
+          </p:cNvPicPr>
+          <p:nvPr/>
+        </p:nvPicPr>
+        <p:blipFill>
+          <a:blip r:embed="rId2">
+            <a:extLst>
+              <a:ext uri="{28A0092B-C50C-407E-A947-70E740481C1C}">
+                <a14:useLocalDpi xmlns:a14="http://schemas.microsoft.com/office/drawing/2010/main" val="0"/>
+              </a:ext>
+            </a:extLst>
+          </a:blip>
+          <a:stretch>
+            <a:fillRect/>
+          </a:stretch>
+        </p:blipFill>
+        <p:spPr>
+          <a:xfrm>
+            <a:off x="190500" y="1612900"/>
+            <a:ext cx="8763000" cy="3619500"/>
+          </a:xfrm>
+          <a:prstGeom prst="rect">
+            <a:avLst/>
+          </a:prstGeom>
+        </p:spPr>
+      </p:pic>
+    </p:spTree>
+    <p:extLst>
+      <p:ext uri="{BB962C8B-B14F-4D97-AF65-F5344CB8AC3E}">
+        <p14:creationId xmlns:p14="http://schemas.microsoft.com/office/powerpoint/2010/main" val="3829269264"/>
       </p:ext>
     </p:extLst>
   </p:cSld>
@@ -6670,7 +7001,7 @@
         <p:spPr>
           <a:xfrm>
             <a:off x="457200" y="1497412"/>
-            <a:ext cx="7910392" cy="3693319"/>
+            <a:ext cx="7910392" cy="5355313"/>
           </a:xfrm>
           <a:prstGeom prst="rect">
             <a:avLst/>
@@ -6726,7 +7057,7 @@
             <a:r>
               <a:rPr lang="en-US" dirty="0">
                 <a:solidFill>
-                  <a:schemeClr val="accent6"/>
+                  <a:srgbClr val="FF0000"/>
                 </a:solidFill>
               </a:rPr>
               <a:t>AIM2 is IFNG-inducible in humans but is constitutively transcribed in mice </a:t>
@@ -6762,8 +7093,56 @@
             </a:r>
             <a:r>
               <a:rPr lang="en-US" dirty="0"/>
-              <a:t>Therefore, the regulation of AIM2 has undergone evolutionary divergence across mammalian lineages, which in turn suggests that the transposition of MER41 upstream of AIM2 may have conferred regulation by IFN signaling in anthropoid primates</a:t>
-            </a:r>
+              <a:t>Therefore, the regulation of AIM2 has undergone evolutionary divergence across mammalian lineages, which in turn suggests that the transposition of MER41 upstream of AIM2 may have conferred regulation by IFN signaling in anthropoid </a:t>
+            </a:r>
+            <a:r>
+              <a:rPr lang="en-US" dirty="0" smtClean="0"/>
+              <a:t>primates</a:t>
+            </a:r>
+          </a:p>
+          <a:p>
+            <a:pPr marL="285750" indent="-285750">
+              <a:buFont typeface="Arial"/>
+              <a:buChar char="•"/>
+            </a:pPr>
+            <a:endParaRPr lang="en-US" dirty="0"/>
+          </a:p>
+          <a:p>
+            <a:pPr marL="285750" indent="-285750">
+              <a:buFont typeface="Arial"/>
+              <a:buChar char="•"/>
+            </a:pPr>
+            <a:r>
+              <a:rPr lang="en-US" dirty="0">
+                <a:solidFill>
+                  <a:srgbClr val="008000"/>
+                </a:solidFill>
+              </a:rPr>
+              <a:t>CRISPR-Cas9 system to delete the MER41.AIM2 element in </a:t>
+            </a:r>
+            <a:r>
+              <a:rPr lang="en-US" dirty="0" err="1">
+                <a:solidFill>
+                  <a:srgbClr val="008000"/>
+                </a:solidFill>
+              </a:rPr>
+              <a:t>HeLa</a:t>
+            </a:r>
+            <a:r>
+              <a:rPr lang="en-US" dirty="0">
+                <a:solidFill>
+                  <a:srgbClr val="008000"/>
+                </a:solidFill>
+              </a:rPr>
+              <a:t> cells (fig. S6) (18). Cells homozygous for the MER41.AIM2 deletion (ΔMER41.AIM2) failed to express AIM2 upon IFNG treatment, in contrast to control cells in which AIM2 transcript levels were robustly induced by IFNG (Fig. 2B)</a:t>
+            </a:r>
+          </a:p>
+          <a:p>
+            <a:pPr marL="285750" indent="-285750">
+              <a:buFont typeface="Arial"/>
+              <a:buChar char="•"/>
+            </a:pPr>
+            <a:endParaRPr lang="en-US" dirty="0"/>
           </a:p>
         </p:txBody>
       </p:sp>

</xml_diff>